<commit_message>
Updated weather station requirements
Updated weather station requirements
</commit_message>
<xml_diff>
--- a/Weather Station.pptx
+++ b/Weather Station.pptx
@@ -13,11 +13,11 @@
     <p:sldId id="273" r:id="rId7"/>
     <p:sldId id="263" r:id="rId8"/>
     <p:sldId id="267" r:id="rId9"/>
-    <p:sldId id="264" r:id="rId10"/>
+    <p:sldId id="271" r:id="rId10"/>
     <p:sldId id="270" r:id="rId11"/>
-    <p:sldId id="271" r:id="rId12"/>
+    <p:sldId id="275" r:id="rId12"/>
     <p:sldId id="266" r:id="rId13"/>
-    <p:sldId id="268" r:id="rId14"/>
+    <p:sldId id="276" r:id="rId14"/>
     <p:sldId id="274" r:id="rId15"/>
     <p:sldId id="272" r:id="rId16"/>
     <p:sldId id="265" r:id="rId17"/>
@@ -258,7 +258,7 @@
           <a:p>
             <a:fld id="{89B9996A-91D4-45F2-9C8A-12DEF277EEBF}" type="datetimeFigureOut">
               <a:rPr lang="en-US" smtClean="0"/>
-              <a:t>10/27/2014</a:t>
+              <a:t>12/14/2014</a:t>
             </a:fld>
             <a:endParaRPr lang="en-US"/>
           </a:p>
@@ -428,7 +428,7 @@
           <a:p>
             <a:fld id="{89B9996A-91D4-45F2-9C8A-12DEF277EEBF}" type="datetimeFigureOut">
               <a:rPr lang="en-US" smtClean="0"/>
-              <a:t>10/27/2014</a:t>
+              <a:t>12/14/2014</a:t>
             </a:fld>
             <a:endParaRPr lang="en-US"/>
           </a:p>
@@ -608,7 +608,7 @@
           <a:p>
             <a:fld id="{89B9996A-91D4-45F2-9C8A-12DEF277EEBF}" type="datetimeFigureOut">
               <a:rPr lang="en-US" smtClean="0"/>
-              <a:t>10/27/2014</a:t>
+              <a:t>12/14/2014</a:t>
             </a:fld>
             <a:endParaRPr lang="en-US"/>
           </a:p>
@@ -778,7 +778,7 @@
           <a:p>
             <a:fld id="{89B9996A-91D4-45F2-9C8A-12DEF277EEBF}" type="datetimeFigureOut">
               <a:rPr lang="en-US" smtClean="0"/>
-              <a:t>10/27/2014</a:t>
+              <a:t>12/14/2014</a:t>
             </a:fld>
             <a:endParaRPr lang="en-US"/>
           </a:p>
@@ -1024,7 +1024,7 @@
           <a:p>
             <a:fld id="{89B9996A-91D4-45F2-9C8A-12DEF277EEBF}" type="datetimeFigureOut">
               <a:rPr lang="en-US" smtClean="0"/>
-              <a:t>10/27/2014</a:t>
+              <a:t>12/14/2014</a:t>
             </a:fld>
             <a:endParaRPr lang="en-US"/>
           </a:p>
@@ -1256,7 +1256,7 @@
           <a:p>
             <a:fld id="{89B9996A-91D4-45F2-9C8A-12DEF277EEBF}" type="datetimeFigureOut">
               <a:rPr lang="en-US" smtClean="0"/>
-              <a:t>10/27/2014</a:t>
+              <a:t>12/14/2014</a:t>
             </a:fld>
             <a:endParaRPr lang="en-US"/>
           </a:p>
@@ -1623,7 +1623,7 @@
           <a:p>
             <a:fld id="{89B9996A-91D4-45F2-9C8A-12DEF277EEBF}" type="datetimeFigureOut">
               <a:rPr lang="en-US" smtClean="0"/>
-              <a:t>10/27/2014</a:t>
+              <a:t>12/14/2014</a:t>
             </a:fld>
             <a:endParaRPr lang="en-US"/>
           </a:p>
@@ -1741,7 +1741,7 @@
           <a:p>
             <a:fld id="{89B9996A-91D4-45F2-9C8A-12DEF277EEBF}" type="datetimeFigureOut">
               <a:rPr lang="en-US" smtClean="0"/>
-              <a:t>10/27/2014</a:t>
+              <a:t>12/14/2014</a:t>
             </a:fld>
             <a:endParaRPr lang="en-US"/>
           </a:p>
@@ -1836,7 +1836,7 @@
           <a:p>
             <a:fld id="{89B9996A-91D4-45F2-9C8A-12DEF277EEBF}" type="datetimeFigureOut">
               <a:rPr lang="en-US" smtClean="0"/>
-              <a:t>10/27/2014</a:t>
+              <a:t>12/14/2014</a:t>
             </a:fld>
             <a:endParaRPr lang="en-US"/>
           </a:p>
@@ -2113,7 +2113,7 @@
           <a:p>
             <a:fld id="{89B9996A-91D4-45F2-9C8A-12DEF277EEBF}" type="datetimeFigureOut">
               <a:rPr lang="en-US" smtClean="0"/>
-              <a:t>10/27/2014</a:t>
+              <a:t>12/14/2014</a:t>
             </a:fld>
             <a:endParaRPr lang="en-US"/>
           </a:p>
@@ -2366,7 +2366,7 @@
           <a:p>
             <a:fld id="{89B9996A-91D4-45F2-9C8A-12DEF277EEBF}" type="datetimeFigureOut">
               <a:rPr lang="en-US" smtClean="0"/>
-              <a:t>10/27/2014</a:t>
+              <a:t>12/14/2014</a:t>
             </a:fld>
             <a:endParaRPr lang="en-US"/>
           </a:p>
@@ -2579,7 +2579,7 @@
           <a:p>
             <a:fld id="{89B9996A-91D4-45F2-9C8A-12DEF277EEBF}" type="datetimeFigureOut">
               <a:rPr lang="en-US" smtClean="0"/>
-              <a:t>10/27/2014</a:t>
+              <a:t>12/14/2014</a:t>
             </a:fld>
             <a:endParaRPr lang="en-US"/>
           </a:p>
@@ -3246,14 +3246,14 @@
       </p:pic>
       <p:pic>
         <p:nvPicPr>
-          <p:cNvPr id="7" name="Picture 4" descr="http://www.clker.com/cliparts/2/k/n/l/C/Q/transparent-green-checkmark-hi.png"/>
+          <p:cNvPr id="8" name="Picture 2" descr="http://michaelwhelton.files.wordpress.com/2012/04/crest-11.jpg"/>
           <p:cNvPicPr>
             <a:picLocks noChangeAspect="1" noChangeArrowheads="1"/>
           </p:cNvPicPr>
           <p:nvPr/>
         </p:nvPicPr>
         <p:blipFill>
-          <a:blip r:embed="rId5" cstate="print">
+          <a:blip r:embed="rId5">
             <a:extLst>
               <a:ext uri="{28A0092B-C50C-407E-A947-70E740481C1C}">
                 <a14:useLocalDpi xmlns:a14="http://schemas.microsoft.com/office/drawing/2010/main" val="0"/>
@@ -3267,8 +3267,8 @@
         </p:blipFill>
         <p:spPr bwMode="auto">
           <a:xfrm>
-            <a:off x="2076647" y="3343881"/>
-            <a:ext cx="1261702" cy="1314826"/>
+            <a:off x="10580205" y="5458283"/>
+            <a:ext cx="1611795" cy="1399717"/>
           </a:xfrm>
           <a:prstGeom prst="rect">
             <a:avLst/>
@@ -3287,14 +3287,14 @@
       </p:pic>
       <p:pic>
         <p:nvPicPr>
-          <p:cNvPr id="8" name="Picture 2" descr="http://michaelwhelton.files.wordpress.com/2012/04/crest-11.jpg"/>
+          <p:cNvPr id="9" name="Picture 4" descr="http://www.clker.com/cliparts/2/k/n/l/C/Q/transparent-green-checkmark-hi.png"/>
           <p:cNvPicPr>
             <a:picLocks noChangeAspect="1" noChangeArrowheads="1"/>
           </p:cNvPicPr>
           <p:nvPr/>
         </p:nvPicPr>
         <p:blipFill>
-          <a:blip r:embed="rId6">
+          <a:blip r:embed="rId6" cstate="print">
             <a:extLst>
               <a:ext uri="{28A0092B-C50C-407E-A947-70E740481C1C}">
                 <a14:useLocalDpi xmlns:a14="http://schemas.microsoft.com/office/drawing/2010/main" val="0"/>
@@ -3308,8 +3308,8 @@
         </p:blipFill>
         <p:spPr bwMode="auto">
           <a:xfrm>
-            <a:off x="10580205" y="5458283"/>
-            <a:ext cx="1611795" cy="1399717"/>
+            <a:off x="2444200" y="3827975"/>
+            <a:ext cx="1261702" cy="1314826"/>
           </a:xfrm>
           <a:prstGeom prst="rect">
             <a:avLst/>
@@ -3375,53 +3375,97 @@
         </p:nvSpPr>
         <p:spPr/>
         <p:txBody>
-          <a:bodyPr/>
-          <a:lstStyle/>
-          <a:p>
-            <a:r>
-              <a:rPr lang="en-US" dirty="0" smtClean="0"/>
-              <a:t>Humidity Sensor</a:t>
-            </a:r>
-            <a:endParaRPr lang="en-US" dirty="0"/>
-          </a:p>
-        </p:txBody>
-      </p:sp>
-      <p:sp>
-        <p:nvSpPr>
-          <p:cNvPr id="3" name="Content Placeholder 2"/>
-          <p:cNvSpPr>
-            <a:spLocks noGrp="1"/>
-          </p:cNvSpPr>
-          <p:nvPr>
-            <p:ph idx="1"/>
-          </p:nvPr>
-        </p:nvSpPr>
-        <p:spPr>
-          <a:xfrm>
-            <a:off x="4661647" y="1825625"/>
-            <a:ext cx="6692152" cy="4351338"/>
-          </a:xfrm>
-        </p:spPr>
-        <p:txBody>
           <a:bodyPr>
             <a:normAutofit/>
           </a:bodyPr>
           <a:lstStyle/>
           <a:p>
+            <a:r>
+              <a:rPr lang="en-US" dirty="0"/>
+              <a:t>AM2302 (wired DHT22) temperature-humidity sensor</a:t>
+            </a:r>
+          </a:p>
+        </p:txBody>
+      </p:sp>
+      <p:sp>
+        <p:nvSpPr>
+          <p:cNvPr id="3" name="Content Placeholder 2"/>
+          <p:cNvSpPr>
+            <a:spLocks noGrp="1"/>
+          </p:cNvSpPr>
+          <p:nvPr>
+            <p:ph idx="1"/>
+          </p:nvPr>
+        </p:nvSpPr>
+        <p:spPr>
+          <a:xfrm>
+            <a:off x="4238625" y="1825625"/>
+            <a:ext cx="7115174" cy="4351338"/>
+          </a:xfrm>
+        </p:spPr>
+        <p:txBody>
+          <a:bodyPr>
+            <a:normAutofit/>
+          </a:bodyPr>
+          <a:lstStyle/>
+          <a:p>
+            <a:r>
+              <a:rPr lang="en-US" b="1" dirty="0" smtClean="0"/>
+              <a:t>COST $15.00 </a:t>
+            </a:r>
+            <a:endParaRPr lang="en-US" b="1" dirty="0" smtClean="0"/>
+          </a:p>
+          <a:p>
+            <a:pPr lvl="1"/>
+            <a:r>
+              <a:rPr lang="en-US" dirty="0">
+                <a:hlinkClick r:id="rId2"/>
+              </a:rPr>
+              <a:t>http://</a:t>
+            </a:r>
+            <a:r>
+              <a:rPr lang="en-US" dirty="0" smtClean="0">
+                <a:hlinkClick r:id="rId2"/>
+              </a:rPr>
+              <a:t>www.adafruit.com/products/393</a:t>
+            </a:r>
+            <a:endParaRPr lang="en-US" dirty="0" smtClean="0"/>
+          </a:p>
+          <a:p>
+            <a:r>
+              <a:rPr lang="en-US" dirty="0" smtClean="0"/>
+              <a:t>Good </a:t>
+            </a:r>
+            <a:r>
+              <a:rPr lang="en-US" dirty="0"/>
+              <a:t>for 0-100% humidity readings with 2-5% accuracy</a:t>
+            </a:r>
+          </a:p>
+          <a:p>
+            <a:r>
+              <a:rPr lang="en-US" dirty="0"/>
+              <a:t>Good for -40 to 80°C temperature readings ±0.5°C accuracy</a:t>
+            </a:r>
+          </a:p>
+          <a:p>
+            <a:pPr lvl="1"/>
+            <a:endParaRPr lang="en-US" dirty="0" smtClean="0"/>
+          </a:p>
+          <a:p>
             <a:endParaRPr lang="en-US" dirty="0"/>
           </a:p>
         </p:txBody>
       </p:sp>
       <p:pic>
         <p:nvPicPr>
-          <p:cNvPr id="5" name="Picture 2" descr="http://michaelwhelton.files.wordpress.com/2012/04/crest-11.jpg"/>
+          <p:cNvPr id="8" name="Picture 2" descr="http://michaelwhelton.files.wordpress.com/2012/04/crest-11.jpg"/>
           <p:cNvPicPr>
             <a:picLocks noChangeAspect="1" noChangeArrowheads="1"/>
           </p:cNvPicPr>
           <p:nvPr/>
         </p:nvPicPr>
         <p:blipFill>
-          <a:blip r:embed="rId2">
+          <a:blip r:embed="rId3">
             <a:extLst>
               <a:ext uri="{28A0092B-C50C-407E-A947-70E740481C1C}">
                 <a14:useLocalDpi xmlns:a14="http://schemas.microsoft.com/office/drawing/2010/main" val="0"/>
@@ -3453,10 +3497,92 @@
           </a:extLst>
         </p:spPr>
       </p:pic>
+      <p:pic>
+        <p:nvPicPr>
+          <p:cNvPr id="1026" name="Picture 2" descr="AM2302 (wired DHT22)  temperature-humidity sensor"/>
+          <p:cNvPicPr>
+            <a:picLocks noChangeAspect="1" noChangeArrowheads="1"/>
+          </p:cNvPicPr>
+          <p:nvPr/>
+        </p:nvPicPr>
+        <p:blipFill>
+          <a:blip r:embed="rId4" cstate="print">
+            <a:extLst>
+              <a:ext uri="{28A0092B-C50C-407E-A947-70E740481C1C}">
+                <a14:useLocalDpi xmlns:a14="http://schemas.microsoft.com/office/drawing/2010/main" val="0"/>
+              </a:ext>
+            </a:extLst>
+          </a:blip>
+          <a:srcRect/>
+          <a:stretch>
+            <a:fillRect/>
+          </a:stretch>
+        </p:blipFill>
+        <p:spPr bwMode="auto">
+          <a:xfrm>
+            <a:off x="399341" y="4114800"/>
+            <a:ext cx="3490101" cy="2619375"/>
+          </a:xfrm>
+          <a:prstGeom prst="rect">
+            <a:avLst/>
+          </a:prstGeom>
+          <a:noFill/>
+          <a:extLst>
+            <a:ext uri="{909E8E84-426E-40DD-AFC4-6F175D3DCCD1}">
+              <a14:hiddenFill xmlns:a14="http://schemas.microsoft.com/office/drawing/2010/main">
+                <a:solidFill>
+                  <a:srgbClr val="FFFFFF"/>
+                </a:solidFill>
+              </a14:hiddenFill>
+            </a:ext>
+          </a:extLst>
+        </p:spPr>
+      </p:pic>
+      <p:pic>
+        <p:nvPicPr>
+          <p:cNvPr id="9" name="Picture 4" descr="http://www.clker.com/cliparts/2/k/n/l/C/Q/transparent-green-checkmark-hi.png"/>
+          <p:cNvPicPr>
+            <a:picLocks noChangeAspect="1" noChangeArrowheads="1"/>
+          </p:cNvPicPr>
+          <p:nvPr/>
+        </p:nvPicPr>
+        <p:blipFill>
+          <a:blip r:embed="rId5" cstate="print">
+            <a:extLst>
+              <a:ext uri="{28A0092B-C50C-407E-A947-70E740481C1C}">
+                <a14:useLocalDpi xmlns:a14="http://schemas.microsoft.com/office/drawing/2010/main" val="0"/>
+              </a:ext>
+            </a:extLst>
+          </a:blip>
+          <a:srcRect/>
+          <a:stretch>
+            <a:fillRect/>
+          </a:stretch>
+        </p:blipFill>
+        <p:spPr bwMode="auto">
+          <a:xfrm>
+            <a:off x="2444200" y="3827975"/>
+            <a:ext cx="1261702" cy="1314826"/>
+          </a:xfrm>
+          <a:prstGeom prst="rect">
+            <a:avLst/>
+          </a:prstGeom>
+          <a:noFill/>
+          <a:extLst>
+            <a:ext uri="{909E8E84-426E-40DD-AFC4-6F175D3DCCD1}">
+              <a14:hiddenFill xmlns:a14="http://schemas.microsoft.com/office/drawing/2010/main">
+                <a:solidFill>
+                  <a:srgbClr val="FFFFFF"/>
+                </a:solidFill>
+              </a14:hiddenFill>
+            </a:ext>
+          </a:extLst>
+        </p:spPr>
+      </p:pic>
     </p:spTree>
     <p:extLst>
       <p:ext uri="{BB962C8B-B14F-4D97-AF65-F5344CB8AC3E}">
-        <p14:creationId xmlns:p14="http://schemas.microsoft.com/office/powerpoint/2010/main" val="766689449"/>
+        <p14:creationId xmlns:p14="http://schemas.microsoft.com/office/powerpoint/2010/main" val="571213914"/>
       </p:ext>
     </p:extLst>
   </p:cSld>
@@ -3556,6 +3682,25 @@
             <a:endParaRPr lang="en-US" dirty="0" smtClean="0"/>
           </a:p>
           <a:p>
+            <a:pPr lvl="1"/>
+            <a:endParaRPr lang="en-US" dirty="0"/>
+          </a:p>
+          <a:p>
+            <a:r>
+              <a:rPr lang="en-US" dirty="0" smtClean="0"/>
+              <a:t>Measures in meters per second. Will need to convert to km per hour.</a:t>
+            </a:r>
+          </a:p>
+          <a:p>
+            <a:r>
+              <a:rPr lang="en-US" dirty="0" smtClean="0"/>
+              <a:t>Requires MCP3008 ADC</a:t>
+            </a:r>
+          </a:p>
+          <a:p>
+            <a:endParaRPr lang="en-US" dirty="0" smtClean="0"/>
+          </a:p>
+          <a:p>
             <a:endParaRPr lang="en-US" dirty="0"/>
           </a:p>
         </p:txBody>
@@ -3583,7 +3728,7 @@
         </p:blipFill>
         <p:spPr bwMode="auto">
           <a:xfrm>
-            <a:off x="316940" y="2456516"/>
+            <a:off x="259790" y="3485216"/>
             <a:ext cx="4116578" cy="3089556"/>
           </a:xfrm>
           <a:prstGeom prst="rect">
@@ -3626,6 +3771,47 @@
           <a:xfrm>
             <a:off x="10580205" y="5458283"/>
             <a:ext cx="1611795" cy="1399717"/>
+          </a:xfrm>
+          <a:prstGeom prst="rect">
+            <a:avLst/>
+          </a:prstGeom>
+          <a:noFill/>
+          <a:extLst>
+            <a:ext uri="{909E8E84-426E-40DD-AFC4-6F175D3DCCD1}">
+              <a14:hiddenFill xmlns:a14="http://schemas.microsoft.com/office/drawing/2010/main">
+                <a:solidFill>
+                  <a:srgbClr val="FFFFFF"/>
+                </a:solidFill>
+              </a14:hiddenFill>
+            </a:ext>
+          </a:extLst>
+        </p:spPr>
+      </p:pic>
+      <p:pic>
+        <p:nvPicPr>
+          <p:cNvPr id="7" name="Picture 4" descr="http://www.clker.com/cliparts/2/k/n/l/C/Q/transparent-green-checkmark-hi.png"/>
+          <p:cNvPicPr>
+            <a:picLocks noChangeAspect="1" noChangeArrowheads="1"/>
+          </p:cNvPicPr>
+          <p:nvPr/>
+        </p:nvPicPr>
+        <p:blipFill>
+          <a:blip r:embed="rId5" cstate="print">
+            <a:extLst>
+              <a:ext uri="{28A0092B-C50C-407E-A947-70E740481C1C}">
+                <a14:useLocalDpi xmlns:a14="http://schemas.microsoft.com/office/drawing/2010/main" val="0"/>
+              </a:ext>
+            </a:extLst>
+          </a:blip>
+          <a:srcRect/>
+          <a:stretch>
+            <a:fillRect/>
+          </a:stretch>
+        </p:blipFill>
+        <p:spPr bwMode="auto">
+          <a:xfrm>
+            <a:off x="2444200" y="3827975"/>
+            <a:ext cx="1261702" cy="1314826"/>
           </a:xfrm>
           <a:prstGeom prst="rect">
             <a:avLst/>
@@ -3695,10 +3881,9 @@
           <a:lstStyle/>
           <a:p>
             <a:r>
-              <a:rPr lang="en-US" dirty="0" smtClean="0"/>
-              <a:t>Wind Direction</a:t>
-            </a:r>
-            <a:endParaRPr lang="en-US" dirty="0"/>
+              <a:rPr lang="en-US" dirty="0"/>
+              <a:t>MCP3008 - 8-Channel 10-Bit ADC With SPI Interface</a:t>
+            </a:r>
           </a:p>
         </p:txBody>
       </p:sp>
@@ -3724,13 +3909,61 @@
           </a:bodyPr>
           <a:lstStyle/>
           <a:p>
+            <a:r>
+              <a:rPr lang="en-US" b="1" dirty="0" smtClean="0"/>
+              <a:t>COST </a:t>
+            </a:r>
+            <a:r>
+              <a:rPr lang="en-US" b="1" dirty="0" smtClean="0"/>
+              <a:t>$3.75 </a:t>
+            </a:r>
+            <a:endParaRPr lang="en-US" b="1" dirty="0" smtClean="0"/>
+          </a:p>
+          <a:p>
+            <a:pPr lvl="1"/>
+            <a:r>
+              <a:rPr lang="en-US" dirty="0"/>
+              <a:t>https://</a:t>
+            </a:r>
+            <a:r>
+              <a:rPr lang="en-US" dirty="0" smtClean="0"/>
+              <a:t>www.adafruit.com/products/856</a:t>
+            </a:r>
+          </a:p>
+          <a:p>
+            <a:pPr lvl="1"/>
+            <a:endParaRPr lang="en-US" dirty="0"/>
+          </a:p>
+          <a:p>
+            <a:r>
+              <a:rPr lang="en-US" dirty="0" smtClean="0"/>
+              <a:t>Tutorials </a:t>
+            </a:r>
+          </a:p>
+          <a:p>
+            <a:pPr lvl="1"/>
+            <a:r>
+              <a:rPr lang="en-US" dirty="0"/>
+              <a:t>https://</a:t>
+            </a:r>
+            <a:r>
+              <a:rPr lang="en-US" dirty="0" smtClean="0"/>
+              <a:t>learn.adafruit.com/reading-a-analog-in-and-controlling-audio-volume-with-the-raspberry-pi</a:t>
+            </a:r>
+          </a:p>
+          <a:p>
+            <a:pPr lvl="1"/>
+            <a:r>
+              <a:rPr lang="en-US" dirty="0"/>
+              <a:t>https://learn.adafruit.com/send-raspberry-pi-data-to-cosm/connecting-the-cobbler-slash-mcp3008-slash-tmp36</a:t>
+            </a:r>
             <a:endParaRPr lang="en-US" dirty="0"/>
           </a:p>
         </p:txBody>
       </p:sp>
       <p:pic>
         <p:nvPicPr>
-          <p:cNvPr id="5" name="Picture 2" descr="http://michaelwhelton.files.wordpress.com/2012/04/crest-11.jpg"/>
+          <p:cNvPr id="6" name="Picture 2" descr="http://michaelwhelton.files.wordpress.com/2012/04/crest-11.jpg"/>
           <p:cNvPicPr>
             <a:picLocks noChangeAspect="1" noChangeArrowheads="1"/>
           </p:cNvPicPr>
@@ -3769,10 +4002,92 @@
           </a:extLst>
         </p:spPr>
       </p:pic>
+      <p:pic>
+        <p:nvPicPr>
+          <p:cNvPr id="3074" name="Picture 2" descr="MCP3008 - 8-Channel 10-Bit ADC With SPI Interface"/>
+          <p:cNvPicPr>
+            <a:picLocks noChangeAspect="1" noChangeArrowheads="1"/>
+          </p:cNvPicPr>
+          <p:nvPr/>
+        </p:nvPicPr>
+        <p:blipFill>
+          <a:blip r:embed="rId3" cstate="print">
+            <a:extLst>
+              <a:ext uri="{28A0092B-C50C-407E-A947-70E740481C1C}">
+                <a14:useLocalDpi xmlns:a14="http://schemas.microsoft.com/office/drawing/2010/main" val="0"/>
+              </a:ext>
+            </a:extLst>
+          </a:blip>
+          <a:srcRect/>
+          <a:stretch>
+            <a:fillRect/>
+          </a:stretch>
+        </p:blipFill>
+        <p:spPr bwMode="auto">
+          <a:xfrm>
+            <a:off x="336550" y="2781301"/>
+            <a:ext cx="3782000" cy="2838450"/>
+          </a:xfrm>
+          <a:prstGeom prst="rect">
+            <a:avLst/>
+          </a:prstGeom>
+          <a:noFill/>
+          <a:extLst>
+            <a:ext uri="{909E8E84-426E-40DD-AFC4-6F175D3DCCD1}">
+              <a14:hiddenFill xmlns:a14="http://schemas.microsoft.com/office/drawing/2010/main">
+                <a:solidFill>
+                  <a:srgbClr val="FFFFFF"/>
+                </a:solidFill>
+              </a14:hiddenFill>
+            </a:ext>
+          </a:extLst>
+        </p:spPr>
+      </p:pic>
+      <p:pic>
+        <p:nvPicPr>
+          <p:cNvPr id="7" name="Picture 4" descr="http://www.clker.com/cliparts/2/k/n/l/C/Q/transparent-green-checkmark-hi.png"/>
+          <p:cNvPicPr>
+            <a:picLocks noChangeAspect="1" noChangeArrowheads="1"/>
+          </p:cNvPicPr>
+          <p:nvPr/>
+        </p:nvPicPr>
+        <p:blipFill>
+          <a:blip r:embed="rId4" cstate="print">
+            <a:extLst>
+              <a:ext uri="{28A0092B-C50C-407E-A947-70E740481C1C}">
+                <a14:useLocalDpi xmlns:a14="http://schemas.microsoft.com/office/drawing/2010/main" val="0"/>
+              </a:ext>
+            </a:extLst>
+          </a:blip>
+          <a:srcRect/>
+          <a:stretch>
+            <a:fillRect/>
+          </a:stretch>
+        </p:blipFill>
+        <p:spPr bwMode="auto">
+          <a:xfrm>
+            <a:off x="2444200" y="3827975"/>
+            <a:ext cx="1261702" cy="1314826"/>
+          </a:xfrm>
+          <a:prstGeom prst="rect">
+            <a:avLst/>
+          </a:prstGeom>
+          <a:noFill/>
+          <a:extLst>
+            <a:ext uri="{909E8E84-426E-40DD-AFC4-6F175D3DCCD1}">
+              <a14:hiddenFill xmlns:a14="http://schemas.microsoft.com/office/drawing/2010/main">
+                <a:solidFill>
+                  <a:srgbClr val="FFFFFF"/>
+                </a:solidFill>
+              </a14:hiddenFill>
+            </a:ext>
+          </a:extLst>
+        </p:spPr>
+      </p:pic>
     </p:spTree>
     <p:extLst>
       <p:ext uri="{BB962C8B-B14F-4D97-AF65-F5344CB8AC3E}">
-        <p14:creationId xmlns:p14="http://schemas.microsoft.com/office/powerpoint/2010/main" val="3200227865"/>
+        <p14:creationId xmlns:p14="http://schemas.microsoft.com/office/powerpoint/2010/main" val="243156292"/>
       </p:ext>
     </p:extLst>
   </p:cSld>
@@ -4056,33 +4371,6 @@
           </a:p>
         </p:txBody>
       </p:sp>
-      <p:sp>
-        <p:nvSpPr>
-          <p:cNvPr id="3" name="Content Placeholder 2"/>
-          <p:cNvSpPr>
-            <a:spLocks noGrp="1"/>
-          </p:cNvSpPr>
-          <p:nvPr>
-            <p:ph idx="1"/>
-          </p:nvPr>
-        </p:nvSpPr>
-        <p:spPr>
-          <a:xfrm>
-            <a:off x="5082988" y="1825625"/>
-            <a:ext cx="6270812" cy="4351338"/>
-          </a:xfrm>
-        </p:spPr>
-        <p:txBody>
-          <a:bodyPr/>
-          <a:lstStyle/>
-          <a:p>
-            <a:pPr marL="457200" lvl="1" indent="0">
-              <a:buNone/>
-            </a:pPr>
-            <a:endParaRPr lang="en-US" dirty="0"/>
-          </a:p>
-        </p:txBody>
-      </p:sp>
       <p:pic>
         <p:nvPicPr>
           <p:cNvPr id="5" name="Picture 2" descr="http://michaelwhelton.files.wordpress.com/2012/04/crest-11.jpg"/>
@@ -4124,6 +4412,203 @@
           </a:extLst>
         </p:spPr>
       </p:pic>
+      <p:sp>
+        <p:nvSpPr>
+          <p:cNvPr id="6" name="Content Placeholder 2"/>
+          <p:cNvSpPr txBox="1">
+            <a:spLocks/>
+          </p:cNvSpPr>
+          <p:nvPr/>
+        </p:nvSpPr>
+        <p:spPr>
+          <a:xfrm>
+            <a:off x="4661647" y="1825625"/>
+            <a:ext cx="6692152" cy="4351338"/>
+          </a:xfrm>
+          <a:prstGeom prst="rect">
+            <a:avLst/>
+          </a:prstGeom>
+        </p:spPr>
+        <p:txBody>
+          <a:bodyPr vert="horz" lIns="91440" tIns="45720" rIns="91440" bIns="45720" rtlCol="0">
+            <a:normAutofit/>
+          </a:bodyPr>
+          <a:lstStyle>
+            <a:lvl1pPr marL="228600" indent="-228600" algn="l" defTabSz="914400" rtl="0" eaLnBrk="1" latinLnBrk="0" hangingPunct="1">
+              <a:lnSpc>
+                <a:spcPct val="90000"/>
+              </a:lnSpc>
+              <a:spcBef>
+                <a:spcPts val="1000"/>
+              </a:spcBef>
+              <a:buFont typeface="Arial" panose="020B0604020202020204" pitchFamily="34" charset="0"/>
+              <a:buChar char="•"/>
+              <a:defRPr sz="2800" kern="1200">
+                <a:solidFill>
+                  <a:schemeClr val="tx1"/>
+                </a:solidFill>
+                <a:latin typeface="+mn-lt"/>
+                <a:ea typeface="+mn-ea"/>
+                <a:cs typeface="+mn-cs"/>
+              </a:defRPr>
+            </a:lvl1pPr>
+            <a:lvl2pPr marL="685800" indent="-228600" algn="l" defTabSz="914400" rtl="0" eaLnBrk="1" latinLnBrk="0" hangingPunct="1">
+              <a:lnSpc>
+                <a:spcPct val="90000"/>
+              </a:lnSpc>
+              <a:spcBef>
+                <a:spcPts val="500"/>
+              </a:spcBef>
+              <a:buFont typeface="Arial" panose="020B0604020202020204" pitchFamily="34" charset="0"/>
+              <a:buChar char="•"/>
+              <a:defRPr sz="2400" kern="1200">
+                <a:solidFill>
+                  <a:schemeClr val="tx1"/>
+                </a:solidFill>
+                <a:latin typeface="+mn-lt"/>
+                <a:ea typeface="+mn-ea"/>
+                <a:cs typeface="+mn-cs"/>
+              </a:defRPr>
+            </a:lvl2pPr>
+            <a:lvl3pPr marL="1143000" indent="-228600" algn="l" defTabSz="914400" rtl="0" eaLnBrk="1" latinLnBrk="0" hangingPunct="1">
+              <a:lnSpc>
+                <a:spcPct val="90000"/>
+              </a:lnSpc>
+              <a:spcBef>
+                <a:spcPts val="500"/>
+              </a:spcBef>
+              <a:buFont typeface="Arial" panose="020B0604020202020204" pitchFamily="34" charset="0"/>
+              <a:buChar char="•"/>
+              <a:defRPr sz="2000" kern="1200">
+                <a:solidFill>
+                  <a:schemeClr val="tx1"/>
+                </a:solidFill>
+                <a:latin typeface="+mn-lt"/>
+                <a:ea typeface="+mn-ea"/>
+                <a:cs typeface="+mn-cs"/>
+              </a:defRPr>
+            </a:lvl3pPr>
+            <a:lvl4pPr marL="1600200" indent="-228600" algn="l" defTabSz="914400" rtl="0" eaLnBrk="1" latinLnBrk="0" hangingPunct="1">
+              <a:lnSpc>
+                <a:spcPct val="90000"/>
+              </a:lnSpc>
+              <a:spcBef>
+                <a:spcPts val="500"/>
+              </a:spcBef>
+              <a:buFont typeface="Arial" panose="020B0604020202020204" pitchFamily="34" charset="0"/>
+              <a:buChar char="•"/>
+              <a:defRPr sz="1800" kern="1200">
+                <a:solidFill>
+                  <a:schemeClr val="tx1"/>
+                </a:solidFill>
+                <a:latin typeface="+mn-lt"/>
+                <a:ea typeface="+mn-ea"/>
+                <a:cs typeface="+mn-cs"/>
+              </a:defRPr>
+            </a:lvl4pPr>
+            <a:lvl5pPr marL="2057400" indent="-228600" algn="l" defTabSz="914400" rtl="0" eaLnBrk="1" latinLnBrk="0" hangingPunct="1">
+              <a:lnSpc>
+                <a:spcPct val="90000"/>
+              </a:lnSpc>
+              <a:spcBef>
+                <a:spcPts val="500"/>
+              </a:spcBef>
+              <a:buFont typeface="Arial" panose="020B0604020202020204" pitchFamily="34" charset="0"/>
+              <a:buChar char="•"/>
+              <a:defRPr sz="1800" kern="1200">
+                <a:solidFill>
+                  <a:schemeClr val="tx1"/>
+                </a:solidFill>
+                <a:latin typeface="+mn-lt"/>
+                <a:ea typeface="+mn-ea"/>
+                <a:cs typeface="+mn-cs"/>
+              </a:defRPr>
+            </a:lvl5pPr>
+            <a:lvl6pPr marL="2514600" indent="-228600" algn="l" defTabSz="914400" rtl="0" eaLnBrk="1" latinLnBrk="0" hangingPunct="1">
+              <a:lnSpc>
+                <a:spcPct val="90000"/>
+              </a:lnSpc>
+              <a:spcBef>
+                <a:spcPts val="500"/>
+              </a:spcBef>
+              <a:buFont typeface="Arial" panose="020B0604020202020204" pitchFamily="34" charset="0"/>
+              <a:buChar char="•"/>
+              <a:defRPr sz="1800" kern="1200">
+                <a:solidFill>
+                  <a:schemeClr val="tx1"/>
+                </a:solidFill>
+                <a:latin typeface="+mn-lt"/>
+                <a:ea typeface="+mn-ea"/>
+                <a:cs typeface="+mn-cs"/>
+              </a:defRPr>
+            </a:lvl6pPr>
+            <a:lvl7pPr marL="2971800" indent="-228600" algn="l" defTabSz="914400" rtl="0" eaLnBrk="1" latinLnBrk="0" hangingPunct="1">
+              <a:lnSpc>
+                <a:spcPct val="90000"/>
+              </a:lnSpc>
+              <a:spcBef>
+                <a:spcPts val="500"/>
+              </a:spcBef>
+              <a:buFont typeface="Arial" panose="020B0604020202020204" pitchFamily="34" charset="0"/>
+              <a:buChar char="•"/>
+              <a:defRPr sz="1800" kern="1200">
+                <a:solidFill>
+                  <a:schemeClr val="tx1"/>
+                </a:solidFill>
+                <a:latin typeface="+mn-lt"/>
+                <a:ea typeface="+mn-ea"/>
+                <a:cs typeface="+mn-cs"/>
+              </a:defRPr>
+            </a:lvl7pPr>
+            <a:lvl8pPr marL="3429000" indent="-228600" algn="l" defTabSz="914400" rtl="0" eaLnBrk="1" latinLnBrk="0" hangingPunct="1">
+              <a:lnSpc>
+                <a:spcPct val="90000"/>
+              </a:lnSpc>
+              <a:spcBef>
+                <a:spcPts val="500"/>
+              </a:spcBef>
+              <a:buFont typeface="Arial" panose="020B0604020202020204" pitchFamily="34" charset="0"/>
+              <a:buChar char="•"/>
+              <a:defRPr sz="1800" kern="1200">
+                <a:solidFill>
+                  <a:schemeClr val="tx1"/>
+                </a:solidFill>
+                <a:latin typeface="+mn-lt"/>
+                <a:ea typeface="+mn-ea"/>
+                <a:cs typeface="+mn-cs"/>
+              </a:defRPr>
+            </a:lvl8pPr>
+            <a:lvl9pPr marL="3886200" indent="-228600" algn="l" defTabSz="914400" rtl="0" eaLnBrk="1" latinLnBrk="0" hangingPunct="1">
+              <a:lnSpc>
+                <a:spcPct val="90000"/>
+              </a:lnSpc>
+              <a:spcBef>
+                <a:spcPts val="500"/>
+              </a:spcBef>
+              <a:buFont typeface="Arial" panose="020B0604020202020204" pitchFamily="34" charset="0"/>
+              <a:buChar char="•"/>
+              <a:defRPr sz="1800" kern="1200">
+                <a:solidFill>
+                  <a:schemeClr val="tx1"/>
+                </a:solidFill>
+                <a:latin typeface="+mn-lt"/>
+                <a:ea typeface="+mn-ea"/>
+                <a:cs typeface="+mn-cs"/>
+              </a:defRPr>
+            </a:lvl9pPr>
+          </a:lstStyle>
+          <a:p>
+            <a:r>
+              <a:rPr lang="en-US" dirty="0" smtClean="0"/>
+              <a:t>If no access to wired power, need reliable battery… possibly solar… </a:t>
+            </a:r>
+          </a:p>
+          <a:p>
+            <a:pPr lvl="1"/>
+            <a:endParaRPr lang="en-US" dirty="0"/>
+          </a:p>
+        </p:txBody>
+      </p:sp>
     </p:spTree>
     <p:extLst>
       <p:ext uri="{BB962C8B-B14F-4D97-AF65-F5344CB8AC3E}">
@@ -4707,7 +5192,15 @@
             </a:r>
             <a:r>
               <a:rPr lang="en-US" b="1" dirty="0" smtClean="0"/>
-              <a:t>, humidity 100%, 	wind NNW at 3.0 km/h #</a:t>
+              <a:t>, humidity 100%, 	wind </a:t>
+            </a:r>
+            <a:r>
+              <a:rPr lang="en-US" b="1" dirty="0" smtClean="0"/>
+              <a:t>13.0 </a:t>
+            </a:r>
+            <a:r>
+              <a:rPr lang="en-US" b="1" dirty="0" smtClean="0"/>
+              <a:t>km/h #</a:t>
             </a:r>
             <a:r>
               <a:rPr lang="en-US" b="1" dirty="0" err="1" smtClean="0"/>
@@ -5109,7 +5602,17 @@
           <a:p>
             <a:r>
               <a:rPr lang="en-US" dirty="0" smtClean="0"/>
-              <a:t>Smarter responses – e.g., don’t forget umbrella</a:t>
+              <a:t>Detect actual precipitation</a:t>
+            </a:r>
+          </a:p>
+          <a:p>
+            <a:r>
+              <a:rPr lang="en-US" dirty="0" smtClean="0"/>
+              <a:t>Smarter </a:t>
+            </a:r>
+            <a:r>
+              <a:rPr lang="en-US" dirty="0" smtClean="0"/>
+              <a:t>responses – e.g., don’t forget umbrella</a:t>
             </a:r>
           </a:p>
           <a:p>
@@ -5298,8 +5801,13 @@
           <a:p>
             <a:r>
               <a:rPr lang="en-US" dirty="0" smtClean="0"/>
-              <a:t>Need to monitor for tweets</a:t>
-            </a:r>
+              <a:t>Need to monitor for </a:t>
+            </a:r>
+            <a:r>
+              <a:rPr lang="en-US" dirty="0" smtClean="0"/>
+              <a:t>tweets, and automatically respond</a:t>
+            </a:r>
+            <a:endParaRPr lang="en-US" dirty="0" smtClean="0"/>
           </a:p>
           <a:p>
             <a:endParaRPr lang="en-US" dirty="0" smtClean="0"/>
@@ -5848,10 +6356,12 @@
           <a:p>
             <a:r>
               <a:rPr lang="en-US" dirty="0" smtClean="0"/>
-              <a:t>Requires MCP3008 (see next slide)</a:t>
-            </a:r>
-          </a:p>
-          <a:p>
+              <a:t>Requires </a:t>
+            </a:r>
+            <a:r>
+              <a:rPr lang="en-US" dirty="0" smtClean="0"/>
+              <a:t>MCP3008 ADC</a:t>
+            </a:r>
             <a:endParaRPr lang="en-US" dirty="0"/>
           </a:p>
         </p:txBody>
@@ -6032,8 +6542,12 @@
           <a:lstStyle/>
           <a:p>
             <a:r>
-              <a:rPr lang="en-US" dirty="0"/>
-              <a:t>MCP3008 - 8-Channel 10-Bit ADC With SPI Interface</a:t>
+              <a:rPr lang="it-IT" dirty="0" smtClean="0"/>
+              <a:t>BMP183 </a:t>
+            </a:r>
+            <a:r>
+              <a:rPr lang="it-IT" dirty="0"/>
+              <a:t>SPI Barometric Pressure &amp; Altitude Sensor</a:t>
             </a:r>
           </a:p>
         </p:txBody>
@@ -6050,8 +6564,8 @@
         </p:nvSpPr>
         <p:spPr>
           <a:xfrm>
-            <a:off x="3558988" y="1825625"/>
-            <a:ext cx="7794811" cy="4351338"/>
+            <a:off x="4661647" y="1825625"/>
+            <a:ext cx="6692152" cy="4351338"/>
           </a:xfrm>
         </p:spPr>
         <p:txBody>
@@ -6062,109 +6576,65 @@
           <a:p>
             <a:r>
               <a:rPr lang="en-US" dirty="0" smtClean="0"/>
-              <a:t>Using with Raspberry Pi (analog to digital)</a:t>
+              <a:t>Tutorials </a:t>
             </a:r>
           </a:p>
           <a:p>
             <a:pPr lvl="1"/>
             <a:r>
-              <a:rPr lang="en-US" dirty="0" smtClean="0">
-                <a:hlinkClick r:id="rId2"/>
-              </a:rPr>
-              <a:t>https</a:t>
-            </a:r>
-            <a:r>
-              <a:rPr lang="en-US" dirty="0">
-                <a:hlinkClick r:id="rId2"/>
-              </a:rPr>
-              <a:t>://</a:t>
-            </a:r>
-            <a:r>
-              <a:rPr lang="en-US" dirty="0" smtClean="0">
-                <a:hlinkClick r:id="rId2"/>
-              </a:rPr>
-              <a:t>learn.adafruit.com/send-raspberry-pi-data-to-cosm/connecting-the-cobbler-slash-mcp3008-slash-tmp36</a:t>
-            </a:r>
-            <a:endParaRPr lang="en-US" dirty="0"/>
-          </a:p>
-          <a:p>
-            <a:r>
-              <a:rPr lang="en-US" b="1" dirty="0" smtClean="0"/>
-              <a:t>COST </a:t>
-            </a:r>
+              <a:rPr lang="en-US" dirty="0"/>
+              <a:t>https://</a:t>
+            </a:r>
+            <a:r>
+              <a:rPr lang="en-US" dirty="0" smtClean="0"/>
+              <a:t>learn.adafruit.com/adafruit-bmp183-spi-barometric-pressure-and-altitude-sensor</a:t>
+            </a:r>
+          </a:p>
+          <a:p>
+            <a:pPr lvl="1"/>
+            <a:r>
+              <a:rPr lang="en-US" dirty="0"/>
+              <a:t>http://</a:t>
+            </a:r>
+            <a:r>
+              <a:rPr lang="en-US" dirty="0" smtClean="0"/>
+              <a:t>forums.adafruit.com/viewtopic.php?f=19&amp;p=285549</a:t>
+            </a:r>
+          </a:p>
+          <a:p>
+            <a:pPr lvl="1"/>
+            <a:endParaRPr lang="en-US" dirty="0" smtClean="0"/>
+          </a:p>
+          <a:p>
             <a:r>
               <a:rPr lang="en-US" b="1" dirty="0"/>
-              <a:t>$</a:t>
-            </a:r>
-            <a:r>
-              <a:rPr lang="en-US" b="1" dirty="0" smtClean="0"/>
-              <a:t>3.75 </a:t>
-            </a:r>
+              <a:t>COST $9.95 </a:t>
+            </a:r>
+            <a:endParaRPr lang="en-US" b="1" dirty="0" smtClean="0"/>
           </a:p>
           <a:p>
             <a:pPr lvl="1"/>
             <a:r>
-              <a:rPr lang="en-US" dirty="0" smtClean="0">
-                <a:hlinkClick r:id="rId3"/>
-              </a:rPr>
-              <a:t>https</a:t>
-            </a:r>
-            <a:r>
-              <a:rPr lang="en-US" dirty="0">
-                <a:hlinkClick r:id="rId3"/>
-              </a:rPr>
-              <a:t>://</a:t>
-            </a:r>
-            <a:r>
-              <a:rPr lang="en-US" dirty="0" smtClean="0">
-                <a:hlinkClick r:id="rId3"/>
-              </a:rPr>
-              <a:t>www.adafruit.com/products/856</a:t>
-            </a:r>
-            <a:endParaRPr lang="en-US" dirty="0" smtClean="0"/>
-          </a:p>
-          <a:p>
-            <a:endParaRPr lang="en-US" dirty="0" smtClean="0"/>
-          </a:p>
-          <a:p>
+              <a:rPr lang="en-US" dirty="0"/>
+              <a:t>http://www.adafruit.com/products/1900</a:t>
+            </a:r>
+          </a:p>
+          <a:p>
+            <a:pPr lvl="1"/>
             <a:endParaRPr lang="en-US" dirty="0"/>
           </a:p>
         </p:txBody>
       </p:sp>
       <p:pic>
         <p:nvPicPr>
-          <p:cNvPr id="5" name="Picture 4"/>
-          <p:cNvPicPr>
-            <a:picLocks noChangeAspect="1"/>
-          </p:cNvPicPr>
-          <p:nvPr/>
-        </p:nvPicPr>
-        <p:blipFill>
-          <a:blip r:embed="rId4"/>
-          <a:stretch>
-            <a:fillRect/>
-          </a:stretch>
-        </p:blipFill>
-        <p:spPr>
-          <a:xfrm>
-            <a:off x="217675" y="2734609"/>
-            <a:ext cx="3162644" cy="2533370"/>
-          </a:xfrm>
-          <a:prstGeom prst="rect">
-            <a:avLst/>
-          </a:prstGeom>
-        </p:spPr>
-      </p:pic>
-      <p:pic>
-        <p:nvPicPr>
-          <p:cNvPr id="7" name="Picture 6" descr="http://upload.wikimedia.org/wikipedia/commons/thumb/5/5f/Red_X.svg/1024px-Red_X.svg.png"/>
+          <p:cNvPr id="5" name="Picture 2" descr="http://michaelwhelton.files.wordpress.com/2012/04/crest-11.jpg"/>
           <p:cNvPicPr>
             <a:picLocks noChangeAspect="1" noChangeArrowheads="1"/>
           </p:cNvPicPr>
           <p:nvPr/>
         </p:nvPicPr>
         <p:blipFill>
-          <a:blip r:embed="rId5" cstate="print">
+          <a:blip r:embed="rId2">
             <a:extLst>
               <a:ext uri="{28A0092B-C50C-407E-A947-70E740481C1C}">
                 <a14:useLocalDpi xmlns:a14="http://schemas.microsoft.com/office/drawing/2010/main" val="0"/>
@@ -6178,8 +6648,8 @@
         </p:blipFill>
         <p:spPr bwMode="auto">
           <a:xfrm>
-            <a:off x="566738" y="2208446"/>
-            <a:ext cx="1052325" cy="1052325"/>
+            <a:off x="10580205" y="5458283"/>
+            <a:ext cx="1611795" cy="1399717"/>
           </a:xfrm>
           <a:prstGeom prst="rect">
             <a:avLst/>
@@ -6198,14 +6668,14 @@
       </p:pic>
       <p:pic>
         <p:nvPicPr>
-          <p:cNvPr id="10" name="Picture 2" descr="http://michaelwhelton.files.wordpress.com/2012/04/crest-11.jpg"/>
+          <p:cNvPr id="2050" name="Picture 2" descr="Adafruit BMP183 SPI Barometric Pressure &amp; Altitude Sensor"/>
           <p:cNvPicPr>
             <a:picLocks noChangeAspect="1" noChangeArrowheads="1"/>
           </p:cNvPicPr>
           <p:nvPr/>
         </p:nvPicPr>
         <p:blipFill>
-          <a:blip r:embed="rId6">
+          <a:blip r:embed="rId3" cstate="print">
             <a:extLst>
               <a:ext uri="{28A0092B-C50C-407E-A947-70E740481C1C}">
                 <a14:useLocalDpi xmlns:a14="http://schemas.microsoft.com/office/drawing/2010/main" val="0"/>
@@ -6219,8 +6689,8 @@
         </p:blipFill>
         <p:spPr bwMode="auto">
           <a:xfrm>
-            <a:off x="10580205" y="5458283"/>
-            <a:ext cx="1611795" cy="1399717"/>
+            <a:off x="603250" y="3106737"/>
+            <a:ext cx="3511550" cy="2635473"/>
           </a:xfrm>
           <a:prstGeom prst="rect">
             <a:avLst/>
@@ -6237,10 +6707,51 @@
           </a:extLst>
         </p:spPr>
       </p:pic>
+      <p:pic>
+        <p:nvPicPr>
+          <p:cNvPr id="6" name="Picture 5" descr="http://upload.wikimedia.org/wikipedia/commons/thumb/5/5f/Red_X.svg/1024px-Red_X.svg.png"/>
+          <p:cNvPicPr>
+            <a:picLocks noChangeAspect="1" noChangeArrowheads="1"/>
+          </p:cNvPicPr>
+          <p:nvPr/>
+        </p:nvPicPr>
+        <p:blipFill>
+          <a:blip r:embed="rId4" cstate="print">
+            <a:extLst>
+              <a:ext uri="{28A0092B-C50C-407E-A947-70E740481C1C}">
+                <a14:useLocalDpi xmlns:a14="http://schemas.microsoft.com/office/drawing/2010/main" val="0"/>
+              </a:ext>
+            </a:extLst>
+          </a:blip>
+          <a:srcRect/>
+          <a:stretch>
+            <a:fillRect/>
+          </a:stretch>
+        </p:blipFill>
+        <p:spPr bwMode="auto">
+          <a:xfrm>
+            <a:off x="2630301" y="4932120"/>
+            <a:ext cx="1052325" cy="1052325"/>
+          </a:xfrm>
+          <a:prstGeom prst="rect">
+            <a:avLst/>
+          </a:prstGeom>
+          <a:noFill/>
+          <a:extLst>
+            <a:ext uri="{909E8E84-426E-40DD-AFC4-6F175D3DCCD1}">
+              <a14:hiddenFill xmlns:a14="http://schemas.microsoft.com/office/drawing/2010/main">
+                <a:solidFill>
+                  <a:srgbClr val="FFFFFF"/>
+                </a:solidFill>
+              </a14:hiddenFill>
+            </a:ext>
+          </a:extLst>
+        </p:spPr>
+      </p:pic>
     </p:spTree>
     <p:extLst>
       <p:ext uri="{BB962C8B-B14F-4D97-AF65-F5344CB8AC3E}">
-        <p14:creationId xmlns:p14="http://schemas.microsoft.com/office/powerpoint/2010/main" val="2897934835"/>
+        <p14:creationId xmlns:p14="http://schemas.microsoft.com/office/powerpoint/2010/main" val="766689449"/>
       </p:ext>
     </p:extLst>
   </p:cSld>

</xml_diff>